<commit_message>
point html to lab 1
</commit_message>
<xml_diff>
--- a/classes/prog2016/Prog3-Lecture01.pptx
+++ b/classes/prog2016/Prog3-Lecture01.pptx
@@ -269,7 +269,7 @@
             <a:fld id="{B59E3D86-40EF-4699-B290-9A90C971F488}" type="datetimeFigureOut">
               <a:rPr lang="en-US" smtClean="0"/>
               <a:pPr/>
-              <a:t>8/16/2016</a:t>
+              <a:t>8/17/2016</a:t>
             </a:fld>
             <a:endParaRPr lang="en-US"/>
           </a:p>
@@ -4732,7 +4732,7 @@
             <a:fld id="{1D8BD707-D9CF-40AE-B4C6-C98DA3205C09}" type="datetimeFigureOut">
               <a:rPr lang="en-US" smtClean="0"/>
               <a:pPr/>
-              <a:t>8/16/2016</a:t>
+              <a:t>8/17/2016</a:t>
             </a:fld>
             <a:endParaRPr lang="en-US"/>
           </a:p>
@@ -4897,7 +4897,7 @@
             <a:fld id="{1D8BD707-D9CF-40AE-B4C6-C98DA3205C09}" type="datetimeFigureOut">
               <a:rPr lang="en-US" smtClean="0"/>
               <a:pPr/>
-              <a:t>8/16/2016</a:t>
+              <a:t>8/17/2016</a:t>
             </a:fld>
             <a:endParaRPr lang="en-US"/>
           </a:p>
@@ -5072,7 +5072,7 @@
             <a:fld id="{1D8BD707-D9CF-40AE-B4C6-C98DA3205C09}" type="datetimeFigureOut">
               <a:rPr lang="en-US" smtClean="0"/>
               <a:pPr/>
-              <a:t>8/16/2016</a:t>
+              <a:t>8/17/2016</a:t>
             </a:fld>
             <a:endParaRPr lang="en-US"/>
           </a:p>
@@ -5237,7 +5237,7 @@
             <a:fld id="{1D8BD707-D9CF-40AE-B4C6-C98DA3205C09}" type="datetimeFigureOut">
               <a:rPr lang="en-US" smtClean="0"/>
               <a:pPr/>
-              <a:t>8/16/2016</a:t>
+              <a:t>8/17/2016</a:t>
             </a:fld>
             <a:endParaRPr lang="en-US"/>
           </a:p>
@@ -5479,7 +5479,7 @@
             <a:fld id="{1D8BD707-D9CF-40AE-B4C6-C98DA3205C09}" type="datetimeFigureOut">
               <a:rPr lang="en-US" smtClean="0"/>
               <a:pPr/>
-              <a:t>8/16/2016</a:t>
+              <a:t>8/17/2016</a:t>
             </a:fld>
             <a:endParaRPr lang="en-US"/>
           </a:p>
@@ -5761,7 +5761,7 @@
             <a:fld id="{1D8BD707-D9CF-40AE-B4C6-C98DA3205C09}" type="datetimeFigureOut">
               <a:rPr lang="en-US" smtClean="0"/>
               <a:pPr/>
-              <a:t>8/16/2016</a:t>
+              <a:t>8/17/2016</a:t>
             </a:fld>
             <a:endParaRPr lang="en-US"/>
           </a:p>
@@ -6177,7 +6177,7 @@
             <a:fld id="{1D8BD707-D9CF-40AE-B4C6-C98DA3205C09}" type="datetimeFigureOut">
               <a:rPr lang="en-US" smtClean="0"/>
               <a:pPr/>
-              <a:t>8/16/2016</a:t>
+              <a:t>8/17/2016</a:t>
             </a:fld>
             <a:endParaRPr lang="en-US"/>
           </a:p>
@@ -6291,7 +6291,7 @@
             <a:fld id="{1D8BD707-D9CF-40AE-B4C6-C98DA3205C09}" type="datetimeFigureOut">
               <a:rPr lang="en-US" smtClean="0"/>
               <a:pPr/>
-              <a:t>8/16/2016</a:t>
+              <a:t>8/17/2016</a:t>
             </a:fld>
             <a:endParaRPr lang="en-US"/>
           </a:p>
@@ -6383,7 +6383,7 @@
             <a:fld id="{1D8BD707-D9CF-40AE-B4C6-C98DA3205C09}" type="datetimeFigureOut">
               <a:rPr lang="en-US" smtClean="0"/>
               <a:pPr/>
-              <a:t>8/16/2016</a:t>
+              <a:t>8/17/2016</a:t>
             </a:fld>
             <a:endParaRPr lang="en-US"/>
           </a:p>
@@ -6655,7 +6655,7 @@
             <a:fld id="{1D8BD707-D9CF-40AE-B4C6-C98DA3205C09}" type="datetimeFigureOut">
               <a:rPr lang="en-US" smtClean="0"/>
               <a:pPr/>
-              <a:t>8/16/2016</a:t>
+              <a:t>8/17/2016</a:t>
             </a:fld>
             <a:endParaRPr lang="en-US"/>
           </a:p>
@@ -6904,7 +6904,7 @@
             <a:fld id="{1D8BD707-D9CF-40AE-B4C6-C98DA3205C09}" type="datetimeFigureOut">
               <a:rPr lang="en-US" smtClean="0"/>
               <a:pPr/>
-              <a:t>8/16/2016</a:t>
+              <a:t>8/17/2016</a:t>
             </a:fld>
             <a:endParaRPr lang="en-US"/>
           </a:p>
@@ -7112,7 +7112,7 @@
             <a:fld id="{1D8BD707-D9CF-40AE-B4C6-C98DA3205C09}" type="datetimeFigureOut">
               <a:rPr lang="en-US" smtClean="0"/>
               <a:pPr/>
-              <a:t>8/16/2016</a:t>
+              <a:t>8/17/2016</a:t>
             </a:fld>
             <a:endParaRPr lang="en-US"/>
           </a:p>
@@ -13577,7 +13577,7 @@
           <a:p>
             <a:r>
               <a:rPr lang="en-US" dirty="0"/>
-              <a:t>Right now.  Try and type in compile and run a HelloWorld.java program</a:t>
+              <a:t>Lab this afternoon.  Try and type in compile and run a HelloWorld.java program</a:t>
             </a:r>
           </a:p>
         </p:txBody>

</xml_diff>